<commit_message>
add Animimation in bound completed
</commit_message>
<xml_diff>
--- a/Documents/PrototypePresentation.pptx
+++ b/Documents/PrototypePresentation.pptx
@@ -5,17 +5,14 @@
     <p:sldMasterId id="2147483803" r:id="rId1"/>
   </p:sldMasterIdLst>
   <p:notesMasterIdLst>
-    <p:notesMasterId r:id="rId10"/>
+    <p:notesMasterId r:id="rId7"/>
   </p:notesMasterIdLst>
   <p:sldIdLst>
     <p:sldId id="256" r:id="rId2"/>
     <p:sldId id="257" r:id="rId3"/>
     <p:sldId id="259" r:id="rId4"/>
-    <p:sldId id="260" r:id="rId5"/>
-    <p:sldId id="261" r:id="rId6"/>
-    <p:sldId id="265" r:id="rId7"/>
-    <p:sldId id="266" r:id="rId8"/>
-    <p:sldId id="267" r:id="rId9"/>
+    <p:sldId id="266" r:id="rId5"/>
+    <p:sldId id="267" r:id="rId6"/>
   </p:sldIdLst>
   <p:sldSz cx="12192000" cy="6858000"/>
   <p:notesSz cx="6858000" cy="9144000"/>
@@ -122,9 +119,6 @@
             <p14:sldId id="256"/>
             <p14:sldId id="257"/>
             <p14:sldId id="259"/>
-            <p14:sldId id="260"/>
-            <p14:sldId id="261"/>
-            <p14:sldId id="265"/>
             <p14:sldId id="266"/>
             <p14:sldId id="267"/>
           </p14:sldIdLst>
@@ -8351,6 +8345,36 @@
           </a:p>
         </p:txBody>
       </p:sp>
+      <p:pic>
+        <p:nvPicPr>
+          <p:cNvPr id="4" name="Picture 3" descr="A pixelated chicken with a black background&#10;&#10;AI-generated content may be incorrect.">
+            <a:extLst>
+              <a:ext uri="{FF2B5EF4-FFF2-40B4-BE49-F238E27FC236}">
+                <a16:creationId xmlns:a16="http://schemas.microsoft.com/office/drawing/2014/main" id="{DE0CE06D-7DAB-567B-D440-C2B37D69C746}"/>
+              </a:ext>
+            </a:extLst>
+          </p:cNvPr>
+          <p:cNvPicPr>
+            <a:picLocks noChangeAspect="1"/>
+          </p:cNvPicPr>
+          <p:nvPr/>
+        </p:nvPicPr>
+        <p:blipFill>
+          <a:blip r:embed="rId5"/>
+          <a:stretch>
+            <a:fillRect/>
+          </a:stretch>
+        </p:blipFill>
+        <p:spPr>
+          <a:xfrm>
+            <a:off x="4892471" y="2684047"/>
+            <a:ext cx="1439503" cy="1457274"/>
+          </a:xfrm>
+          <a:prstGeom prst="rect">
+            <a:avLst/>
+          </a:prstGeom>
+        </p:spPr>
+      </p:pic>
     </p:spTree>
     <p:extLst>
       <p:ext uri="{BB962C8B-B14F-4D97-AF65-F5344CB8AC3E}">
@@ -8762,638 +8786,6 @@
 </file>
 
 <file path=ppt/slides/slide4.xml><?xml version="1.0" encoding="utf-8"?>
-<p:sld xmlns:a="http://schemas.openxmlformats.org/drawingml/2006/main" xmlns:r="http://schemas.openxmlformats.org/officeDocument/2006/relationships" xmlns:p="http://schemas.openxmlformats.org/presentationml/2006/main">
-  <p:cSld>
-    <p:spTree>
-      <p:nvGrpSpPr>
-        <p:cNvPr id="1" name=""/>
-        <p:cNvGrpSpPr/>
-        <p:nvPr/>
-      </p:nvGrpSpPr>
-      <p:grpSpPr>
-        <a:xfrm>
-          <a:off x="0" y="0"/>
-          <a:ext cx="0" cy="0"/>
-          <a:chOff x="0" y="0"/>
-          <a:chExt cx="0" cy="0"/>
-        </a:xfrm>
-      </p:grpSpPr>
-      <p:sp>
-        <p:nvSpPr>
-          <p:cNvPr id="2" name="Title 1">
-            <a:extLst>
-              <a:ext uri="{FF2B5EF4-FFF2-40B4-BE49-F238E27FC236}">
-                <a16:creationId xmlns:a16="http://schemas.microsoft.com/office/drawing/2014/main" id="{CD346969-908F-367F-F944-0DD6EC157D2B}"/>
-              </a:ext>
-            </a:extLst>
-          </p:cNvPr>
-          <p:cNvSpPr>
-            <a:spLocks noGrp="1"/>
-          </p:cNvSpPr>
-          <p:nvPr>
-            <p:ph type="title"/>
-          </p:nvPr>
-        </p:nvSpPr>
-        <p:spPr>
-          <a:xfrm>
-            <a:off x="280449" y="0"/>
-            <a:ext cx="10396882" cy="876693"/>
-          </a:xfrm>
-        </p:spPr>
-        <p:txBody>
-          <a:bodyPr>
-            <a:normAutofit/>
-          </a:bodyPr>
-          <a:lstStyle/>
-          <a:p>
-            <a:r>
-              <a:rPr lang="en-US" sz="4800" dirty="0"/>
-              <a:t>enemy</a:t>
-            </a:r>
-          </a:p>
-        </p:txBody>
-      </p:sp>
-      <p:pic>
-        <p:nvPicPr>
-          <p:cNvPr id="5" name="Content Placeholder 4">
-            <a:extLst>
-              <a:ext uri="{FF2B5EF4-FFF2-40B4-BE49-F238E27FC236}">
-                <a16:creationId xmlns:a16="http://schemas.microsoft.com/office/drawing/2014/main" id="{BCFBC38E-3A47-19F6-EE80-5A4E9AE76273}"/>
-              </a:ext>
-            </a:extLst>
-          </p:cNvPr>
-          <p:cNvPicPr>
-            <a:picLocks noGrp="1" noChangeAspect="1"/>
-          </p:cNvPicPr>
-          <p:nvPr>
-            <p:ph idx="1"/>
-          </p:nvPr>
-        </p:nvPicPr>
-        <p:blipFill>
-          <a:blip r:embed="rId2">
-            <a:extLst>
-              <a:ext uri="{28A0092B-C50C-407E-A947-70E740481C1C}">
-                <a14:useLocalDpi xmlns:a14="http://schemas.microsoft.com/office/drawing/2010/main" val="0"/>
-              </a:ext>
-            </a:extLst>
-          </a:blip>
-          <a:stretch>
-            <a:fillRect/>
-          </a:stretch>
-        </p:blipFill>
-        <p:spPr>
-          <a:xfrm>
-            <a:off x="1412134" y="834429"/>
-            <a:ext cx="8457730" cy="4740048"/>
-          </a:xfrm>
-        </p:spPr>
-      </p:pic>
-    </p:spTree>
-    <p:extLst>
-      <p:ext uri="{BB962C8B-B14F-4D97-AF65-F5344CB8AC3E}">
-        <p14:creationId xmlns:p14="http://schemas.microsoft.com/office/powerpoint/2010/main" val="4082065593"/>
-      </p:ext>
-    </p:extLst>
-  </p:cSld>
-  <p:clrMapOvr>
-    <a:masterClrMapping/>
-  </p:clrMapOvr>
-</p:sld>
-</file>
-
-<file path=ppt/slides/slide5.xml><?xml version="1.0" encoding="utf-8"?>
-<p:sld xmlns:a="http://schemas.openxmlformats.org/drawingml/2006/main" xmlns:r="http://schemas.openxmlformats.org/officeDocument/2006/relationships" xmlns:p="http://schemas.openxmlformats.org/presentationml/2006/main">
-  <p:cSld>
-    <p:spTree>
-      <p:nvGrpSpPr>
-        <p:cNvPr id="1" name="">
-          <a:extLst>
-            <a:ext uri="{FF2B5EF4-FFF2-40B4-BE49-F238E27FC236}">
-              <a16:creationId xmlns:a16="http://schemas.microsoft.com/office/drawing/2014/main" id="{55A59BE1-03AD-8954-1689-4AA325B6D8F2}"/>
-            </a:ext>
-          </a:extLst>
-        </p:cNvPr>
-        <p:cNvGrpSpPr/>
-        <p:nvPr/>
-      </p:nvGrpSpPr>
-      <p:grpSpPr>
-        <a:xfrm>
-          <a:off x="0" y="0"/>
-          <a:ext cx="0" cy="0"/>
-          <a:chOff x="0" y="0"/>
-          <a:chExt cx="0" cy="0"/>
-        </a:xfrm>
-      </p:grpSpPr>
-      <p:sp>
-        <p:nvSpPr>
-          <p:cNvPr id="2" name="Title 1">
-            <a:extLst>
-              <a:ext uri="{FF2B5EF4-FFF2-40B4-BE49-F238E27FC236}">
-                <a16:creationId xmlns:a16="http://schemas.microsoft.com/office/drawing/2014/main" id="{59618BF8-663A-1557-3DF3-CA60CD5BF597}"/>
-              </a:ext>
-            </a:extLst>
-          </p:cNvPr>
-          <p:cNvSpPr>
-            <a:spLocks noGrp="1"/>
-          </p:cNvSpPr>
-          <p:nvPr>
-            <p:ph type="title"/>
-          </p:nvPr>
-        </p:nvSpPr>
-        <p:spPr>
-          <a:xfrm>
-            <a:off x="280449" y="0"/>
-            <a:ext cx="10396882" cy="876693"/>
-          </a:xfrm>
-        </p:spPr>
-        <p:txBody>
-          <a:bodyPr>
-            <a:normAutofit/>
-          </a:bodyPr>
-          <a:lstStyle/>
-          <a:p>
-            <a:r>
-              <a:rPr lang="en-US" sz="4800" dirty="0"/>
-              <a:t>enemy</a:t>
-            </a:r>
-          </a:p>
-        </p:txBody>
-      </p:sp>
-      <p:pic>
-        <p:nvPicPr>
-          <p:cNvPr id="7" name="Content Placeholder 6">
-            <a:extLst>
-              <a:ext uri="{FF2B5EF4-FFF2-40B4-BE49-F238E27FC236}">
-                <a16:creationId xmlns:a16="http://schemas.microsoft.com/office/drawing/2014/main" id="{F9EA6770-164F-EBD9-6984-C2D27E718479}"/>
-              </a:ext>
-            </a:extLst>
-          </p:cNvPr>
-          <p:cNvPicPr>
-            <a:picLocks noGrp="1" noChangeAspect="1"/>
-          </p:cNvPicPr>
-          <p:nvPr>
-            <p:ph idx="1"/>
-          </p:nvPr>
-        </p:nvPicPr>
-        <p:blipFill>
-          <a:blip r:embed="rId2">
-            <a:extLst>
-              <a:ext uri="{28A0092B-C50C-407E-A947-70E740481C1C}">
-                <a14:useLocalDpi xmlns:a14="http://schemas.microsoft.com/office/drawing/2010/main" val="0"/>
-              </a:ext>
-            </a:extLst>
-          </a:blip>
-          <a:stretch>
-            <a:fillRect/>
-          </a:stretch>
-        </p:blipFill>
-        <p:spPr>
-          <a:xfrm>
-            <a:off x="1439254" y="836629"/>
-            <a:ext cx="8442607" cy="4716762"/>
-          </a:xfrm>
-        </p:spPr>
-      </p:pic>
-      <p:cxnSp>
-        <p:nvCxnSpPr>
-          <p:cNvPr id="8" name="Straight Arrow Connector 7">
-            <a:extLst>
-              <a:ext uri="{FF2B5EF4-FFF2-40B4-BE49-F238E27FC236}">
-                <a16:creationId xmlns:a16="http://schemas.microsoft.com/office/drawing/2014/main" id="{F3F55901-4A59-0D54-D625-50BEED485F88}"/>
-              </a:ext>
-            </a:extLst>
-          </p:cNvPr>
-          <p:cNvCxnSpPr>
-            <a:cxnSpLocks/>
-          </p:cNvCxnSpPr>
-          <p:nvPr/>
-        </p:nvCxnSpPr>
-        <p:spPr>
-          <a:xfrm>
-            <a:off x="3903062" y="2024405"/>
-            <a:ext cx="961169" cy="549113"/>
-          </a:xfrm>
-          <a:prstGeom prst="straightConnector1">
-            <a:avLst/>
-          </a:prstGeom>
-          <a:ln w="76200">
-            <a:tailEnd type="triangle"/>
-          </a:ln>
-        </p:spPr>
-        <p:style>
-          <a:lnRef idx="1">
-            <a:schemeClr val="accent1"/>
-          </a:lnRef>
-          <a:fillRef idx="0">
-            <a:schemeClr val="accent1"/>
-          </a:fillRef>
-          <a:effectRef idx="0">
-            <a:schemeClr val="accent1"/>
-          </a:effectRef>
-          <a:fontRef idx="minor">
-            <a:schemeClr val="tx1"/>
-          </a:fontRef>
-        </p:style>
-      </p:cxnSp>
-      <p:cxnSp>
-        <p:nvCxnSpPr>
-          <p:cNvPr id="10" name="Straight Arrow Connector 9">
-            <a:extLst>
-              <a:ext uri="{FF2B5EF4-FFF2-40B4-BE49-F238E27FC236}">
-                <a16:creationId xmlns:a16="http://schemas.microsoft.com/office/drawing/2014/main" id="{C4C9C7A9-3E19-95F0-3E3B-2EFB208C646A}"/>
-              </a:ext>
-            </a:extLst>
-          </p:cNvPr>
-          <p:cNvCxnSpPr>
-            <a:cxnSpLocks/>
-          </p:cNvCxnSpPr>
-          <p:nvPr/>
-        </p:nvCxnSpPr>
-        <p:spPr>
-          <a:xfrm flipH="1">
-            <a:off x="6628510" y="3025326"/>
-            <a:ext cx="960067" cy="0"/>
-          </a:xfrm>
-          <a:prstGeom prst="straightConnector1">
-            <a:avLst/>
-          </a:prstGeom>
-          <a:ln w="76200">
-            <a:tailEnd type="triangle"/>
-          </a:ln>
-        </p:spPr>
-        <p:style>
-          <a:lnRef idx="1">
-            <a:schemeClr val="accent1"/>
-          </a:lnRef>
-          <a:fillRef idx="0">
-            <a:schemeClr val="accent1"/>
-          </a:fillRef>
-          <a:effectRef idx="0">
-            <a:schemeClr val="accent1"/>
-          </a:effectRef>
-          <a:fontRef idx="minor">
-            <a:schemeClr val="tx1"/>
-          </a:fontRef>
-        </p:style>
-      </p:cxnSp>
-    </p:spTree>
-    <p:extLst>
-      <p:ext uri="{BB962C8B-B14F-4D97-AF65-F5344CB8AC3E}">
-        <p14:creationId xmlns:p14="http://schemas.microsoft.com/office/powerpoint/2010/main" val="2047002001"/>
-      </p:ext>
-    </p:extLst>
-  </p:cSld>
-  <p:clrMapOvr>
-    <a:masterClrMapping/>
-  </p:clrMapOvr>
-  <p:timing>
-    <p:tnLst>
-      <p:par>
-        <p:cTn id="1" dur="indefinite" restart="never" nodeType="tmRoot">
-          <p:childTnLst>
-            <p:seq concurrent="1" nextAc="seek">
-              <p:cTn id="2" dur="indefinite" nodeType="mainSeq">
-                <p:childTnLst>
-                  <p:par>
-                    <p:cTn id="3" fill="hold">
-                      <p:stCondLst>
-                        <p:cond delay="indefinite"/>
-                      </p:stCondLst>
-                      <p:childTnLst>
-                        <p:par>
-                          <p:cTn id="4" fill="hold">
-                            <p:stCondLst>
-                              <p:cond delay="0"/>
-                            </p:stCondLst>
-                            <p:childTnLst>
-                              <p:par>
-                                <p:cTn id="5" presetID="1" presetClass="entr" presetSubtype="0" fill="hold" nodeType="clickEffect">
-                                  <p:stCondLst>
-                                    <p:cond delay="0"/>
-                                  </p:stCondLst>
-                                  <p:childTnLst>
-                                    <p:set>
-                                      <p:cBhvr>
-                                        <p:cTn id="6" dur="1" fill="hold">
-                                          <p:stCondLst>
-                                            <p:cond delay="0"/>
-                                          </p:stCondLst>
-                                        </p:cTn>
-                                        <p:tgtEl>
-                                          <p:spTgt spid="8"/>
-                                        </p:tgtEl>
-                                        <p:attrNameLst>
-                                          <p:attrName>style.visibility</p:attrName>
-                                        </p:attrNameLst>
-                                      </p:cBhvr>
-                                      <p:to>
-                                        <p:strVal val="visible"/>
-                                      </p:to>
-                                    </p:set>
-                                  </p:childTnLst>
-                                </p:cTn>
-                              </p:par>
-                              <p:par>
-                                <p:cTn id="7" presetID="1" presetClass="entr" presetSubtype="0" fill="hold" nodeType="withEffect">
-                                  <p:stCondLst>
-                                    <p:cond delay="0"/>
-                                  </p:stCondLst>
-                                  <p:childTnLst>
-                                    <p:set>
-                                      <p:cBhvr>
-                                        <p:cTn id="8" dur="1" fill="hold">
-                                          <p:stCondLst>
-                                            <p:cond delay="0"/>
-                                          </p:stCondLst>
-                                        </p:cTn>
-                                        <p:tgtEl>
-                                          <p:spTgt spid="10"/>
-                                        </p:tgtEl>
-                                        <p:attrNameLst>
-                                          <p:attrName>style.visibility</p:attrName>
-                                        </p:attrNameLst>
-                                      </p:cBhvr>
-                                      <p:to>
-                                        <p:strVal val="visible"/>
-                                      </p:to>
-                                    </p:set>
-                                  </p:childTnLst>
-                                </p:cTn>
-                              </p:par>
-                            </p:childTnLst>
-                          </p:cTn>
-                        </p:par>
-                      </p:childTnLst>
-                    </p:cTn>
-                  </p:par>
-                </p:childTnLst>
-              </p:cTn>
-              <p:prevCondLst>
-                <p:cond evt="onPrev" delay="0">
-                  <p:tgtEl>
-                    <p:sldTgt/>
-                  </p:tgtEl>
-                </p:cond>
-              </p:prevCondLst>
-              <p:nextCondLst>
-                <p:cond evt="onNext" delay="0">
-                  <p:tgtEl>
-                    <p:sldTgt/>
-                  </p:tgtEl>
-                </p:cond>
-              </p:nextCondLst>
-            </p:seq>
-          </p:childTnLst>
-        </p:cTn>
-      </p:par>
-    </p:tnLst>
-  </p:timing>
-</p:sld>
-</file>
-
-<file path=ppt/slides/slide6.xml><?xml version="1.0" encoding="utf-8"?>
-<p:sld xmlns:a="http://schemas.openxmlformats.org/drawingml/2006/main" xmlns:r="http://schemas.openxmlformats.org/officeDocument/2006/relationships" xmlns:p="http://schemas.openxmlformats.org/presentationml/2006/main">
-  <p:cSld>
-    <p:spTree>
-      <p:nvGrpSpPr>
-        <p:cNvPr id="1" name="">
-          <a:extLst>
-            <a:ext uri="{FF2B5EF4-FFF2-40B4-BE49-F238E27FC236}">
-              <a16:creationId xmlns:a16="http://schemas.microsoft.com/office/drawing/2014/main" id="{86ADB1A4-429D-7702-393B-0223738326E0}"/>
-            </a:ext>
-          </a:extLst>
-        </p:cNvPr>
-        <p:cNvGrpSpPr/>
-        <p:nvPr/>
-      </p:nvGrpSpPr>
-      <p:grpSpPr>
-        <a:xfrm>
-          <a:off x="0" y="0"/>
-          <a:ext cx="0" cy="0"/>
-          <a:chOff x="0" y="0"/>
-          <a:chExt cx="0" cy="0"/>
-        </a:xfrm>
-      </p:grpSpPr>
-      <p:sp>
-        <p:nvSpPr>
-          <p:cNvPr id="2" name="Title 1">
-            <a:extLst>
-              <a:ext uri="{FF2B5EF4-FFF2-40B4-BE49-F238E27FC236}">
-                <a16:creationId xmlns:a16="http://schemas.microsoft.com/office/drawing/2014/main" id="{F8DB4934-3792-4D94-DA38-6A5ACBDFEA2C}"/>
-              </a:ext>
-            </a:extLst>
-          </p:cNvPr>
-          <p:cNvSpPr>
-            <a:spLocks noGrp="1"/>
-          </p:cNvSpPr>
-          <p:nvPr>
-            <p:ph type="title"/>
-          </p:nvPr>
-        </p:nvSpPr>
-        <p:spPr>
-          <a:xfrm>
-            <a:off x="280449" y="0"/>
-            <a:ext cx="10396882" cy="876693"/>
-          </a:xfrm>
-        </p:spPr>
-        <p:txBody>
-          <a:bodyPr>
-            <a:normAutofit/>
-          </a:bodyPr>
-          <a:lstStyle/>
-          <a:p>
-            <a:r>
-              <a:rPr lang="en-US" sz="4800" dirty="0"/>
-              <a:t>Game flow</a:t>
-            </a:r>
-          </a:p>
-        </p:txBody>
-      </p:sp>
-      <p:pic>
-        <p:nvPicPr>
-          <p:cNvPr id="3" name="gameflow">
-            <a:hlinkClick r:id="" action="ppaction://media"/>
-            <a:extLst>
-              <a:ext uri="{FF2B5EF4-FFF2-40B4-BE49-F238E27FC236}">
-                <a16:creationId xmlns:a16="http://schemas.microsoft.com/office/drawing/2014/main" id="{2EC76061-11E2-67A0-95FD-F668F90FDDD4}"/>
-              </a:ext>
-            </a:extLst>
-          </p:cNvPr>
-          <p:cNvPicPr>
-            <a:picLocks noGrp="1" noChangeAspect="1"/>
-          </p:cNvPicPr>
-          <p:nvPr>
-            <p:ph idx="1"/>
-            <a:videoFile r:link="rId2"/>
-            <p:extLst>
-              <p:ext uri="{DAA4B4D4-6D71-4841-9C94-3DE7FCFB9230}">
-                <p14:media xmlns:p14="http://schemas.microsoft.com/office/powerpoint/2010/main" r:embed="rId1"/>
-              </p:ext>
-            </p:extLst>
-          </p:nvPr>
-        </p:nvPicPr>
-        <p:blipFill>
-          <a:blip r:embed="rId4"/>
-          <a:stretch>
-            <a:fillRect/>
-          </a:stretch>
-        </p:blipFill>
-        <p:spPr>
-          <a:xfrm>
-            <a:off x="1514669" y="791852"/>
-            <a:ext cx="8515302" cy="4754529"/>
-          </a:xfrm>
-        </p:spPr>
-      </p:pic>
-    </p:spTree>
-    <p:extLst>
-      <p:ext uri="{BB962C8B-B14F-4D97-AF65-F5344CB8AC3E}">
-        <p14:creationId xmlns:p14="http://schemas.microsoft.com/office/powerpoint/2010/main" val="368927474"/>
-      </p:ext>
-    </p:extLst>
-  </p:cSld>
-  <p:clrMapOvr>
-    <a:masterClrMapping/>
-  </p:clrMapOvr>
-  <p:timing>
-    <p:tnLst>
-      <p:par>
-        <p:cTn id="1" dur="indefinite" restart="never" nodeType="tmRoot">
-          <p:childTnLst>
-            <p:seq concurrent="1" nextAc="seek">
-              <p:cTn id="2" dur="indefinite" nodeType="mainSeq">
-                <p:childTnLst>
-                  <p:par>
-                    <p:cTn id="3" fill="hold">
-                      <p:stCondLst>
-                        <p:cond delay="indefinite"/>
-                      </p:stCondLst>
-                      <p:childTnLst>
-                        <p:par>
-                          <p:cTn id="4" fill="hold">
-                            <p:stCondLst>
-                              <p:cond delay="0"/>
-                            </p:stCondLst>
-                            <p:childTnLst>
-                              <p:par>
-                                <p:cTn id="5" presetID="1" presetClass="mediacall" presetSubtype="0" fill="hold" nodeType="clickEffect">
-                                  <p:stCondLst>
-                                    <p:cond delay="0"/>
-                                  </p:stCondLst>
-                                  <p:childTnLst>
-                                    <p:cmd type="call" cmd="playFrom(0.0)">
-                                      <p:cBhvr>
-                                        <p:cTn id="6" dur="21000" fill="hold"/>
-                                        <p:tgtEl>
-                                          <p:spTgt spid="3"/>
-                                        </p:tgtEl>
-                                      </p:cBhvr>
-                                    </p:cmd>
-                                  </p:childTnLst>
-                                </p:cTn>
-                              </p:par>
-                            </p:childTnLst>
-                          </p:cTn>
-                        </p:par>
-                      </p:childTnLst>
-                    </p:cTn>
-                  </p:par>
-                </p:childTnLst>
-              </p:cTn>
-              <p:prevCondLst>
-                <p:cond evt="onPrev" delay="0">
-                  <p:tgtEl>
-                    <p:sldTgt/>
-                  </p:tgtEl>
-                </p:cond>
-              </p:prevCondLst>
-              <p:nextCondLst>
-                <p:cond evt="onNext" delay="0">
-                  <p:tgtEl>
-                    <p:sldTgt/>
-                  </p:tgtEl>
-                </p:cond>
-              </p:nextCondLst>
-            </p:seq>
-            <p:video>
-              <p:cMediaNode vol="80000">
-                <p:cTn id="7" fill="hold" display="0">
-                  <p:stCondLst>
-                    <p:cond delay="indefinite"/>
-                  </p:stCondLst>
-                </p:cTn>
-                <p:tgtEl>
-                  <p:spTgt spid="3"/>
-                </p:tgtEl>
-              </p:cMediaNode>
-            </p:video>
-            <p:seq concurrent="1" nextAc="seek">
-              <p:cTn id="8" restart="whenNotActive" fill="hold" evtFilter="cancelBubble" nodeType="interactiveSeq">
-                <p:stCondLst>
-                  <p:cond evt="onClick" delay="0">
-                    <p:tgtEl>
-                      <p:spTgt spid="3"/>
-                    </p:tgtEl>
-                  </p:cond>
-                </p:stCondLst>
-                <p:endSync evt="end" delay="0">
-                  <p:rtn val="all"/>
-                </p:endSync>
-                <p:childTnLst>
-                  <p:par>
-                    <p:cTn id="9" fill="hold">
-                      <p:stCondLst>
-                        <p:cond delay="0"/>
-                      </p:stCondLst>
-                      <p:childTnLst>
-                        <p:par>
-                          <p:cTn id="10" fill="hold">
-                            <p:stCondLst>
-                              <p:cond delay="0"/>
-                            </p:stCondLst>
-                            <p:childTnLst>
-                              <p:par>
-                                <p:cTn id="11" presetID="2" presetClass="mediacall" presetSubtype="0" fill="hold" nodeType="clickEffect">
-                                  <p:stCondLst>
-                                    <p:cond delay="0"/>
-                                  </p:stCondLst>
-                                  <p:childTnLst>
-                                    <p:cmd type="call" cmd="togglePause">
-                                      <p:cBhvr>
-                                        <p:cTn id="12" dur="1" fill="hold"/>
-                                        <p:tgtEl>
-                                          <p:spTgt spid="3"/>
-                                        </p:tgtEl>
-                                      </p:cBhvr>
-                                    </p:cmd>
-                                  </p:childTnLst>
-                                </p:cTn>
-                              </p:par>
-                            </p:childTnLst>
-                          </p:cTn>
-                        </p:par>
-                      </p:childTnLst>
-                    </p:cTn>
-                  </p:par>
-                </p:childTnLst>
-              </p:cTn>
-              <p:nextCondLst>
-                <p:cond evt="onClick" delay="0">
-                  <p:tgtEl>
-                    <p:spTgt spid="3"/>
-                  </p:tgtEl>
-                </p:cond>
-              </p:nextCondLst>
-            </p:seq>
-          </p:childTnLst>
-        </p:cTn>
-      </p:par>
-    </p:tnLst>
-  </p:timing>
-</p:sld>
-</file>
-
-<file path=ppt/slides/slide7.xml><?xml version="1.0" encoding="utf-8"?>
 <p:sld xmlns:a="http://schemas.openxmlformats.org/drawingml/2006/main" xmlns:r="http://schemas.openxmlformats.org/officeDocument/2006/relationships" xmlns:p="http://schemas.openxmlformats.org/presentationml/2006/main">
   <p:cSld>
     <p:spTree>
@@ -10728,7 +10120,7 @@
 </p:sld>
 </file>
 
-<file path=ppt/slides/slide8.xml><?xml version="1.0" encoding="utf-8"?>
+<file path=ppt/slides/slide5.xml><?xml version="1.0" encoding="utf-8"?>
 <p:sld xmlns:a="http://schemas.openxmlformats.org/drawingml/2006/main" xmlns:r="http://schemas.openxmlformats.org/officeDocument/2006/relationships" xmlns:p="http://schemas.openxmlformats.org/presentationml/2006/main">
   <p:cSld>
     <p:spTree>

</xml_diff>